<commit_message>
Ajuste de fecha en mapa conceptual de mat6 tema 4
</commit_message>
<xml_diff>
--- a/fuentes/contenidos/grado06/guion04/MA_06_04_CO_Mapa conceptual.pptx
+++ b/fuentes/contenidos/grado06/guion04/MA_06_04_CO_Mapa conceptual.pptx
@@ -197,7 +197,7 @@
           <a:p>
             <a:fld id="{7A3C5493-B8A1-4477-8B1C-2F671EBCDBF5}" type="datetimeFigureOut">
               <a:rPr lang="es-CO" smtClean="0"/>
-              <a:t>23/10/2015</a:t>
+              <a:t>16/12/2015</a:t>
             </a:fld>
             <a:endParaRPr lang="es-CO"/>
           </a:p>
@@ -887,7 +887,7 @@
           <a:p>
             <a:fld id="{5001C876-01F7-4317-94B9-1AE222133113}" type="datetimeFigureOut">
               <a:rPr lang="es-ES" smtClean="0"/>
-              <a:t>23/10/2015</a:t>
+              <a:t>16/12/2015</a:t>
             </a:fld>
             <a:endParaRPr lang="es-ES"/>
           </a:p>
@@ -1075,8 +1075,8 @@
         </p:nvSpPr>
         <p:spPr>
           <a:xfrm rot="16200000">
-            <a:off x="-1278861" y="1710405"/>
-            <a:ext cx="3121368" cy="276999"/>
+            <a:off x="-1257221" y="1710405"/>
+            <a:ext cx="3078087" cy="276999"/>
           </a:xfrm>
           <a:prstGeom prst="rect">
             <a:avLst/>
@@ -1095,7 +1095,14 @@
                 <a:latin typeface="Arial" panose="020B0604020202020204" pitchFamily="34" charset="0"/>
                 <a:cs typeface="Arial" panose="020B0604020202020204" pitchFamily="34" charset="0"/>
               </a:rPr>
-              <a:t>© Editorial Planeta Colombiana S.A., 2015.</a:t>
+              <a:t>© Editorial Planeta Colombiana S.A., </a:t>
+            </a:r>
+            <a:r>
+              <a:rPr lang="es-ES" sz="1200" dirty="0" smtClean="0">
+                <a:latin typeface="Arial" panose="020B0604020202020204" pitchFamily="34" charset="0"/>
+                <a:cs typeface="Arial" panose="020B0604020202020204" pitchFamily="34" charset="0"/>
+              </a:rPr>
+              <a:t>2016</a:t>
             </a:r>
             <a:endParaRPr lang="es-ES" sz="1200" dirty="0">
               <a:latin typeface="Arial" panose="020B0604020202020204" pitchFamily="34" charset="0"/>
@@ -1607,27 +1614,7 @@
                 <a:latin typeface="Arial" panose="020B0604020202020204" pitchFamily="34" charset="0"/>
                 <a:cs typeface="Arial" panose="020B0604020202020204" pitchFamily="34" charset="0"/>
               </a:rPr>
-              <a:t>todos </a:t>
-            </a:r>
-            <a:r>
-              <a:rPr lang="es-ES" sz="900" dirty="0" smtClean="0">
-                <a:solidFill>
-                  <a:schemeClr val="tx1"/>
-                </a:solidFill>
-                <a:latin typeface="Arial" panose="020B0604020202020204" pitchFamily="34" charset="0"/>
-                <a:cs typeface="Arial" panose="020B0604020202020204" pitchFamily="34" charset="0"/>
-              </a:rPr>
-              <a:t>los </a:t>
-            </a:r>
-            <a:r>
-              <a:rPr lang="es-ES" sz="900" dirty="0" smtClean="0">
-                <a:solidFill>
-                  <a:schemeClr val="tx1"/>
-                </a:solidFill>
-                <a:latin typeface="Arial" panose="020B0604020202020204" pitchFamily="34" charset="0"/>
-                <a:cs typeface="Arial" panose="020B0604020202020204" pitchFamily="34" charset="0"/>
-              </a:rPr>
-              <a:t>producto obtenidos al multiplicar </a:t>
+              <a:t>todos los producto obtenidos al multiplicar </a:t>
             </a:r>
             <a:r>
               <a:rPr lang="es-ES" sz="900" i="1" dirty="0" smtClean="0">
@@ -1960,14 +1947,7 @@
                 <a:latin typeface="Arial" panose="020B0604020202020204" pitchFamily="34" charset="0"/>
                 <a:cs typeface="Arial" panose="020B0604020202020204" pitchFamily="34" charset="0"/>
               </a:rPr>
-              <a:t>ermite </a:t>
-            </a:r>
-            <a:r>
-              <a:rPr lang="es-ES" sz="900" dirty="0" smtClean="0">
-                <a:latin typeface="Arial" panose="020B0604020202020204" pitchFamily="34" charset="0"/>
-                <a:cs typeface="Arial" panose="020B0604020202020204" pitchFamily="34" charset="0"/>
-              </a:rPr>
-              <a:t>definir</a:t>
+              <a:t>ermite definir</a:t>
             </a:r>
             <a:endParaRPr lang="es-ES" sz="900" dirty="0">
               <a:latin typeface="Arial" panose="020B0604020202020204" pitchFamily="34" charset="0"/>
@@ -2030,14 +2010,7 @@
                 <a:latin typeface="Arial" panose="020B0604020202020204" pitchFamily="34" charset="0"/>
                 <a:cs typeface="Arial" panose="020B0604020202020204" pitchFamily="34" charset="0"/>
               </a:rPr>
-              <a:t>Relaciones </a:t>
-            </a:r>
-            <a:r>
-              <a:rPr lang="es-ES" sz="1200" b="1" dirty="0" smtClean="0">
-                <a:latin typeface="Arial" panose="020B0604020202020204" pitchFamily="34" charset="0"/>
-                <a:cs typeface="Arial" panose="020B0604020202020204" pitchFamily="34" charset="0"/>
-              </a:rPr>
-              <a:t>multiplicativas</a:t>
+              <a:t>Relaciones multiplicativas</a:t>
             </a:r>
             <a:endParaRPr lang="es-ES" sz="1200" b="1" dirty="0">
               <a:latin typeface="Arial" panose="020B0604020202020204" pitchFamily="34" charset="0"/>
@@ -2185,14 +2158,7 @@
                 <a:latin typeface="Arial" panose="020B0604020202020204" pitchFamily="34" charset="0"/>
                 <a:cs typeface="Arial" panose="020B0604020202020204" pitchFamily="34" charset="0"/>
               </a:rPr>
-              <a:t>que corresponde </a:t>
-            </a:r>
-            <a:r>
-              <a:rPr lang="es-ES" sz="900" dirty="0" smtClean="0">
-                <a:latin typeface="Arial" panose="020B0604020202020204" pitchFamily="34" charset="0"/>
-                <a:cs typeface="Arial" panose="020B0604020202020204" pitchFamily="34" charset="0"/>
-              </a:rPr>
-              <a:t>a </a:t>
+              <a:t>que corresponde a </a:t>
             </a:r>
             <a:endParaRPr lang="es-ES" sz="900" dirty="0">
               <a:latin typeface="Arial" panose="020B0604020202020204" pitchFamily="34" charset="0"/>
@@ -2492,8 +2458,501 @@
                 <a:latin typeface="Arial" panose="020B0604020202020204" pitchFamily="34" charset="0"/>
                 <a:cs typeface="Arial" panose="020B0604020202020204" pitchFamily="34" charset="0"/>
               </a:rPr>
-              <a:t>el </a:t>
-            </a:r>
+              <a:t>el menor de los múltiplos comunes entre dos o más números </a:t>
+            </a:r>
+            <a:endParaRPr lang="es-ES" sz="750" dirty="0">
+              <a:solidFill>
+                <a:schemeClr val="tx1"/>
+              </a:solidFill>
+              <a:latin typeface="Arial" panose="020B0604020202020204" pitchFamily="34" charset="0"/>
+              <a:cs typeface="Arial" panose="020B0604020202020204" pitchFamily="34" charset="0"/>
+            </a:endParaRPr>
+          </a:p>
+        </p:txBody>
+      </p:sp>
+      <p:cxnSp>
+        <p:nvCxnSpPr>
+          <p:cNvPr id="167" name="Conector angular 166"/>
+          <p:cNvCxnSpPr/>
+          <p:nvPr/>
+        </p:nvCxnSpPr>
+        <p:spPr>
+          <a:xfrm rot="5400000">
+            <a:off x="959481" y="4145690"/>
+            <a:ext cx="143025" cy="876"/>
+          </a:xfrm>
+          <a:prstGeom prst="bentConnector3">
+            <a:avLst>
+              <a:gd name="adj1" fmla="val 50000"/>
+            </a:avLst>
+          </a:prstGeom>
+          <a:ln w="12700">
+            <a:solidFill>
+              <a:schemeClr val="tx1"/>
+            </a:solidFill>
+          </a:ln>
+        </p:spPr>
+        <p:style>
+          <a:lnRef idx="1">
+            <a:schemeClr val="accent1"/>
+          </a:lnRef>
+          <a:fillRef idx="0">
+            <a:schemeClr val="accent1"/>
+          </a:fillRef>
+          <a:effectRef idx="0">
+            <a:schemeClr val="accent1"/>
+          </a:effectRef>
+          <a:fontRef idx="minor">
+            <a:schemeClr val="tx1"/>
+          </a:fontRef>
+        </p:style>
+      </p:cxnSp>
+      <p:sp>
+        <p:nvSpPr>
+          <p:cNvPr id="171" name="Rectángulo 170" descr="Nodo de cuarto nivel&#10;" title="Nodo04"/>
+          <p:cNvSpPr/>
+          <p:nvPr/>
+        </p:nvSpPr>
+        <p:spPr>
+          <a:xfrm>
+            <a:off x="3867203" y="5410261"/>
+            <a:ext cx="672123" cy="536201"/>
+          </a:xfrm>
+          <a:prstGeom prst="rect">
+            <a:avLst/>
+          </a:prstGeom>
+          <a:solidFill>
+            <a:schemeClr val="bg1"/>
+          </a:solidFill>
+          <a:ln>
+            <a:solidFill>
+              <a:schemeClr val="tx1"/>
+            </a:solidFill>
+          </a:ln>
+        </p:spPr>
+        <p:style>
+          <a:lnRef idx="2">
+            <a:schemeClr val="accent6"/>
+          </a:lnRef>
+          <a:fillRef idx="1">
+            <a:schemeClr val="lt1"/>
+          </a:fillRef>
+          <a:effectRef idx="0">
+            <a:schemeClr val="accent6"/>
+          </a:effectRef>
+          <a:fontRef idx="minor">
+            <a:schemeClr val="dk1"/>
+          </a:fontRef>
+        </p:style>
+        <p:txBody>
+          <a:bodyPr rtlCol="0" anchor="ctr"/>
+          <a:lstStyle/>
+          <a:p>
+            <a:pPr algn="ctr"/>
+            <a:r>
+              <a:rPr lang="es-ES" sz="800" dirty="0" smtClean="0">
+                <a:solidFill>
+                  <a:schemeClr val="tx1"/>
+                </a:solidFill>
+                <a:latin typeface="Arial" panose="020B0604020202020204" pitchFamily="34" charset="0"/>
+                <a:cs typeface="Arial" panose="020B0604020202020204" pitchFamily="34" charset="0"/>
+              </a:rPr>
+              <a:t>todo número es divisor de sí mismo</a:t>
+            </a:r>
+            <a:endParaRPr lang="es-ES" sz="800" dirty="0">
+              <a:solidFill>
+                <a:schemeClr val="tx1"/>
+              </a:solidFill>
+              <a:latin typeface="Arial" panose="020B0604020202020204" pitchFamily="34" charset="0"/>
+              <a:cs typeface="Arial" panose="020B0604020202020204" pitchFamily="34" charset="0"/>
+            </a:endParaRPr>
+          </a:p>
+        </p:txBody>
+      </p:sp>
+      <p:sp>
+        <p:nvSpPr>
+          <p:cNvPr id="172" name="CuadroTexto 171" descr="Conector entre nodos" title="conector"/>
+          <p:cNvSpPr txBox="1"/>
+          <p:nvPr/>
+        </p:nvSpPr>
+        <p:spPr>
+          <a:xfrm>
+            <a:off x="4375954" y="4562279"/>
+            <a:ext cx="1117174" cy="215444"/>
+          </a:xfrm>
+          <a:prstGeom prst="rect">
+            <a:avLst/>
+          </a:prstGeom>
+          <a:noFill/>
+        </p:spPr>
+        <p:txBody>
+          <a:bodyPr wrap="square" rtlCol="0">
+            <a:spAutoFit/>
+          </a:bodyPr>
+          <a:lstStyle/>
+          <a:p>
+            <a:pPr algn="ctr"/>
+            <a:r>
+              <a:rPr lang="es-ES" sz="800" dirty="0" smtClean="0">
+                <a:latin typeface="Arial" panose="020B0604020202020204" pitchFamily="34" charset="0"/>
+                <a:cs typeface="Arial" panose="020B0604020202020204" pitchFamily="34" charset="0"/>
+              </a:rPr>
+              <a:t>como</a:t>
+            </a:r>
+            <a:endParaRPr lang="es-ES" sz="800" dirty="0">
+              <a:latin typeface="Arial" panose="020B0604020202020204" pitchFamily="34" charset="0"/>
+              <a:cs typeface="Arial" panose="020B0604020202020204" pitchFamily="34" charset="0"/>
+            </a:endParaRPr>
+          </a:p>
+        </p:txBody>
+      </p:sp>
+      <p:sp>
+        <p:nvSpPr>
+          <p:cNvPr id="176" name="Rectángulo 175" descr="Nodo de cuarto nivel&#10;" title="Nodo04"/>
+          <p:cNvSpPr/>
+          <p:nvPr/>
+        </p:nvSpPr>
+        <p:spPr>
+          <a:xfrm>
+            <a:off x="4625520" y="5814820"/>
+            <a:ext cx="646249" cy="576405"/>
+          </a:xfrm>
+          <a:prstGeom prst="rect">
+            <a:avLst/>
+          </a:prstGeom>
+          <a:solidFill>
+            <a:schemeClr val="bg1"/>
+          </a:solidFill>
+          <a:ln>
+            <a:solidFill>
+              <a:schemeClr val="tx1"/>
+            </a:solidFill>
+          </a:ln>
+        </p:spPr>
+        <p:style>
+          <a:lnRef idx="2">
+            <a:schemeClr val="accent6"/>
+          </a:lnRef>
+          <a:fillRef idx="1">
+            <a:schemeClr val="lt1"/>
+          </a:fillRef>
+          <a:effectRef idx="0">
+            <a:schemeClr val="accent6"/>
+          </a:effectRef>
+          <a:fontRef idx="minor">
+            <a:schemeClr val="dk1"/>
+          </a:fontRef>
+        </p:style>
+        <p:txBody>
+          <a:bodyPr rtlCol="0" anchor="ctr"/>
+          <a:lstStyle/>
+          <a:p>
+            <a:pPr algn="ctr"/>
+            <a:r>
+              <a:rPr lang="es-ES" sz="800" dirty="0" smtClean="0">
+                <a:solidFill>
+                  <a:schemeClr val="tx1"/>
+                </a:solidFill>
+                <a:latin typeface="Arial" panose="020B0604020202020204" pitchFamily="34" charset="0"/>
+                <a:cs typeface="Arial" panose="020B0604020202020204" pitchFamily="34" charset="0"/>
+              </a:rPr>
+              <a:t>uno es divisor de todos los números</a:t>
+            </a:r>
+            <a:endParaRPr lang="es-ES" sz="800" dirty="0">
+              <a:solidFill>
+                <a:schemeClr val="tx1"/>
+              </a:solidFill>
+              <a:latin typeface="Arial" panose="020B0604020202020204" pitchFamily="34" charset="0"/>
+              <a:cs typeface="Arial" panose="020B0604020202020204" pitchFamily="34" charset="0"/>
+            </a:endParaRPr>
+          </a:p>
+        </p:txBody>
+      </p:sp>
+      <p:sp>
+        <p:nvSpPr>
+          <p:cNvPr id="178" name="CuadroTexto 177" descr="Conector entre nodos" title="conector"/>
+          <p:cNvSpPr txBox="1"/>
+          <p:nvPr/>
+        </p:nvSpPr>
+        <p:spPr>
+          <a:xfrm>
+            <a:off x="4490176" y="3800266"/>
+            <a:ext cx="941455" cy="215444"/>
+          </a:xfrm>
+          <a:prstGeom prst="rect">
+            <a:avLst/>
+          </a:prstGeom>
+          <a:noFill/>
+        </p:spPr>
+        <p:txBody>
+          <a:bodyPr wrap="square" rtlCol="0">
+            <a:spAutoFit/>
+          </a:bodyPr>
+          <a:lstStyle/>
+          <a:p>
+            <a:pPr algn="ctr"/>
+            <a:r>
+              <a:rPr lang="es-ES" sz="800" dirty="0" smtClean="0">
+                <a:latin typeface="Arial" panose="020B0604020202020204" pitchFamily="34" charset="0"/>
+                <a:cs typeface="Arial" panose="020B0604020202020204" pitchFamily="34" charset="0"/>
+              </a:rPr>
+              <a:t>cumplen</a:t>
+            </a:r>
+            <a:endParaRPr lang="es-ES" sz="800" dirty="0">
+              <a:latin typeface="Arial" panose="020B0604020202020204" pitchFamily="34" charset="0"/>
+              <a:cs typeface="Arial" panose="020B0604020202020204" pitchFamily="34" charset="0"/>
+            </a:endParaRPr>
+          </a:p>
+        </p:txBody>
+      </p:sp>
+      <p:cxnSp>
+        <p:nvCxnSpPr>
+          <p:cNvPr id="179" name="Conector angular 178"/>
+          <p:cNvCxnSpPr/>
+          <p:nvPr/>
+        </p:nvCxnSpPr>
+        <p:spPr>
+          <a:xfrm rot="10800000" flipV="1">
+            <a:off x="4941786" y="3664531"/>
+            <a:ext cx="1534069" cy="170064"/>
+          </a:xfrm>
+          <a:prstGeom prst="bentConnector2">
+            <a:avLst/>
+          </a:prstGeom>
+          <a:ln w="12700">
+            <a:solidFill>
+              <a:schemeClr val="tx1"/>
+            </a:solidFill>
+          </a:ln>
+        </p:spPr>
+        <p:style>
+          <a:lnRef idx="1">
+            <a:schemeClr val="accent1"/>
+          </a:lnRef>
+          <a:fillRef idx="0">
+            <a:schemeClr val="accent1"/>
+          </a:fillRef>
+          <a:effectRef idx="0">
+            <a:schemeClr val="accent1"/>
+          </a:effectRef>
+          <a:fontRef idx="minor">
+            <a:schemeClr val="tx1"/>
+          </a:fontRef>
+        </p:style>
+      </p:cxnSp>
+      <p:sp>
+        <p:nvSpPr>
+          <p:cNvPr id="180" name="CuadroTexto 179" descr="Conector entre nodos" title="conector"/>
+          <p:cNvSpPr txBox="1"/>
+          <p:nvPr/>
+        </p:nvSpPr>
+        <p:spPr>
+          <a:xfrm>
+            <a:off x="5931256" y="2560938"/>
+            <a:ext cx="1211833" cy="230832"/>
+          </a:xfrm>
+          <a:prstGeom prst="rect">
+            <a:avLst/>
+          </a:prstGeom>
+          <a:noFill/>
+        </p:spPr>
+        <p:txBody>
+          <a:bodyPr wrap="square" rtlCol="0">
+            <a:spAutoFit/>
+          </a:bodyPr>
+          <a:lstStyle/>
+          <a:p>
+            <a:pPr algn="ctr"/>
+            <a:r>
+              <a:rPr lang="es-ES" sz="900" dirty="0" smtClean="0">
+                <a:latin typeface="Arial" panose="020B0604020202020204" pitchFamily="34" charset="0"/>
+                <a:cs typeface="Arial" panose="020B0604020202020204" pitchFamily="34" charset="0"/>
+              </a:rPr>
+              <a:t>que corresponde a </a:t>
+            </a:r>
+            <a:endParaRPr lang="es-ES" sz="900" dirty="0">
+              <a:latin typeface="Arial" panose="020B0604020202020204" pitchFamily="34" charset="0"/>
+              <a:cs typeface="Arial" panose="020B0604020202020204" pitchFamily="34" charset="0"/>
+            </a:endParaRPr>
+          </a:p>
+        </p:txBody>
+      </p:sp>
+      <p:cxnSp>
+        <p:nvCxnSpPr>
+          <p:cNvPr id="181" name="Conector angular 180"/>
+          <p:cNvCxnSpPr/>
+          <p:nvPr/>
+        </p:nvCxnSpPr>
+        <p:spPr>
+          <a:xfrm rot="5400000">
+            <a:off x="6285115" y="2545050"/>
+            <a:ext cx="143025" cy="876"/>
+          </a:xfrm>
+          <a:prstGeom prst="bentConnector3">
+            <a:avLst>
+              <a:gd name="adj1" fmla="val 50000"/>
+            </a:avLst>
+          </a:prstGeom>
+          <a:ln w="12700">
+            <a:solidFill>
+              <a:schemeClr val="tx1"/>
+            </a:solidFill>
+          </a:ln>
+        </p:spPr>
+        <p:style>
+          <a:lnRef idx="1">
+            <a:schemeClr val="accent1"/>
+          </a:lnRef>
+          <a:fillRef idx="0">
+            <a:schemeClr val="accent1"/>
+          </a:fillRef>
+          <a:effectRef idx="0">
+            <a:schemeClr val="accent1"/>
+          </a:effectRef>
+          <a:fontRef idx="minor">
+            <a:schemeClr val="tx1"/>
+          </a:fontRef>
+        </p:style>
+      </p:cxnSp>
+      <p:sp>
+        <p:nvSpPr>
+          <p:cNvPr id="183" name="Rectángulo 182" descr="Nodo de cuarto nivel&#10;" title="Nodo04"/>
+          <p:cNvSpPr/>
+          <p:nvPr/>
+        </p:nvSpPr>
+        <p:spPr>
+          <a:xfrm>
+            <a:off x="5475252" y="5427423"/>
+            <a:ext cx="805968" cy="576404"/>
+          </a:xfrm>
+          <a:prstGeom prst="rect">
+            <a:avLst/>
+          </a:prstGeom>
+          <a:solidFill>
+            <a:schemeClr val="bg1"/>
+          </a:solidFill>
+          <a:ln>
+            <a:solidFill>
+              <a:schemeClr val="tx1"/>
+            </a:solidFill>
+          </a:ln>
+        </p:spPr>
+        <p:style>
+          <a:lnRef idx="2">
+            <a:schemeClr val="accent6"/>
+          </a:lnRef>
+          <a:fillRef idx="1">
+            <a:schemeClr val="lt1"/>
+          </a:fillRef>
+          <a:effectRef idx="0">
+            <a:schemeClr val="accent6"/>
+          </a:effectRef>
+          <a:fontRef idx="minor">
+            <a:schemeClr val="dk1"/>
+          </a:fontRef>
+        </p:style>
+        <p:txBody>
+          <a:bodyPr rtlCol="0" anchor="ctr"/>
+          <a:lstStyle/>
+          <a:p>
+            <a:pPr algn="ctr"/>
+            <a:r>
+              <a:rPr lang="es-ES" sz="800" dirty="0" smtClean="0">
+                <a:solidFill>
+                  <a:schemeClr val="tx1"/>
+                </a:solidFill>
+                <a:latin typeface="Arial" panose="020B0604020202020204" pitchFamily="34" charset="0"/>
+                <a:cs typeface="Arial" panose="020B0604020202020204" pitchFamily="34" charset="0"/>
+              </a:rPr>
+              <a:t>los divisores de un número son finitos</a:t>
+            </a:r>
+            <a:endParaRPr lang="es-ES" sz="800" dirty="0">
+              <a:solidFill>
+                <a:schemeClr val="tx1"/>
+              </a:solidFill>
+              <a:latin typeface="Arial" panose="020B0604020202020204" pitchFamily="34" charset="0"/>
+              <a:cs typeface="Arial" panose="020B0604020202020204" pitchFamily="34" charset="0"/>
+            </a:endParaRPr>
+          </a:p>
+        </p:txBody>
+      </p:sp>
+      <p:cxnSp>
+        <p:nvCxnSpPr>
+          <p:cNvPr id="186" name="Conector angular 185"/>
+          <p:cNvCxnSpPr/>
+          <p:nvPr/>
+        </p:nvCxnSpPr>
+        <p:spPr>
+          <a:xfrm rot="5400000">
+            <a:off x="6285114" y="2824331"/>
+            <a:ext cx="143025" cy="876"/>
+          </a:xfrm>
+          <a:prstGeom prst="bentConnector3">
+            <a:avLst>
+              <a:gd name="adj1" fmla="val 50000"/>
+            </a:avLst>
+          </a:prstGeom>
+          <a:ln w="12700">
+            <a:solidFill>
+              <a:schemeClr val="tx1"/>
+            </a:solidFill>
+          </a:ln>
+        </p:spPr>
+        <p:style>
+          <a:lnRef idx="1">
+            <a:schemeClr val="accent1"/>
+          </a:lnRef>
+          <a:fillRef idx="0">
+            <a:schemeClr val="accent1"/>
+          </a:fillRef>
+          <a:effectRef idx="0">
+            <a:schemeClr val="accent1"/>
+          </a:effectRef>
+          <a:fontRef idx="minor">
+            <a:schemeClr val="tx1"/>
+          </a:fontRef>
+        </p:style>
+      </p:cxnSp>
+      <p:sp>
+        <p:nvSpPr>
+          <p:cNvPr id="187" name="Rectángulo 186" descr="Nodo de tercer nivel" title="Nodo03"/>
+          <p:cNvSpPr/>
+          <p:nvPr/>
+        </p:nvSpPr>
+        <p:spPr>
+          <a:xfrm>
+            <a:off x="5626907" y="4841695"/>
+            <a:ext cx="1234800" cy="374902"/>
+          </a:xfrm>
+          <a:prstGeom prst="rect">
+            <a:avLst/>
+          </a:prstGeom>
+          <a:noFill/>
+          <a:ln>
+            <a:solidFill>
+              <a:schemeClr val="tx1"/>
+            </a:solidFill>
+          </a:ln>
+        </p:spPr>
+        <p:style>
+          <a:lnRef idx="2">
+            <a:schemeClr val="accent6"/>
+          </a:lnRef>
+          <a:fillRef idx="1">
+            <a:schemeClr val="lt1"/>
+          </a:fillRef>
+          <a:effectRef idx="0">
+            <a:schemeClr val="accent6"/>
+          </a:effectRef>
+          <a:fontRef idx="minor">
+            <a:schemeClr val="dk1"/>
+          </a:fontRef>
+        </p:style>
+        <p:txBody>
+          <a:bodyPr rtlCol="0" anchor="ctr"/>
+          <a:lstStyle/>
+          <a:p>
+            <a:pPr algn="ctr"/>
             <a:r>
               <a:rPr lang="es-ES" sz="750" dirty="0" smtClean="0">
                 <a:solidFill>
@@ -2502,7 +2961,7 @@
                 <a:latin typeface="Arial" panose="020B0604020202020204" pitchFamily="34" charset="0"/>
                 <a:cs typeface="Arial" panose="020B0604020202020204" pitchFamily="34" charset="0"/>
               </a:rPr>
-              <a:t>menor de los múltiplos comunes entre dos o más números </a:t>
+              <a:t>el mayor de los divisores comunes entre dos o más números </a:t>
             </a:r>
             <a:endParaRPr lang="es-ES" sz="750" dirty="0">
               <a:solidFill>
@@ -2516,13 +2975,13 @@
       </p:sp>
       <p:cxnSp>
         <p:nvCxnSpPr>
-          <p:cNvPr id="167" name="Conector angular 166"/>
+          <p:cNvPr id="188" name="Conector angular 187"/>
           <p:cNvCxnSpPr/>
           <p:nvPr/>
         </p:nvCxnSpPr>
         <p:spPr>
           <a:xfrm rot="5400000">
-            <a:off x="959481" y="4145690"/>
+            <a:off x="6284237" y="3613307"/>
             <a:ext cx="143025" cy="876"/>
           </a:xfrm>
           <a:prstGeom prst="bentConnector3">
@@ -2553,21 +3012,19 @@
       </p:cxnSp>
       <p:sp>
         <p:nvSpPr>
-          <p:cNvPr id="171" name="Rectángulo 170" descr="Nodo de cuarto nivel&#10;" title="Nodo04"/>
+          <p:cNvPr id="194" name="Rectángulo 193" descr="Nodo de cuarto nivel&#10;" title="Nodo04"/>
           <p:cNvSpPr/>
           <p:nvPr/>
         </p:nvSpPr>
         <p:spPr>
           <a:xfrm>
-            <a:off x="3867203" y="5410261"/>
-            <a:ext cx="672123" cy="536201"/>
+            <a:off x="6904760" y="4122654"/>
+            <a:ext cx="812429" cy="353519"/>
           </a:xfrm>
           <a:prstGeom prst="rect">
             <a:avLst/>
           </a:prstGeom>
-          <a:solidFill>
-            <a:schemeClr val="bg1"/>
-          </a:solidFill>
+          <a:noFill/>
           <a:ln>
             <a:solidFill>
               <a:schemeClr val="tx1"/>
@@ -2601,8 +3058,58 @@
                 <a:latin typeface="Arial" panose="020B0604020202020204" pitchFamily="34" charset="0"/>
                 <a:cs typeface="Arial" panose="020B0604020202020204" pitchFamily="34" charset="0"/>
               </a:rPr>
-              <a:t>todo </a:t>
-            </a:r>
+              <a:t>criterios de divisibilidad</a:t>
+            </a:r>
+            <a:endParaRPr lang="es-ES" sz="800" dirty="0">
+              <a:solidFill>
+                <a:schemeClr val="tx1"/>
+              </a:solidFill>
+              <a:latin typeface="Arial" panose="020B0604020202020204" pitchFamily="34" charset="0"/>
+              <a:cs typeface="Arial" panose="020B0604020202020204" pitchFamily="34" charset="0"/>
+            </a:endParaRPr>
+          </a:p>
+        </p:txBody>
+      </p:sp>
+      <p:sp>
+        <p:nvSpPr>
+          <p:cNvPr id="199" name="Rectángulo 198" descr="Nodo de cuarto nivel&#10;" title="Nodo04"/>
+          <p:cNvSpPr/>
+          <p:nvPr/>
+        </p:nvSpPr>
+        <p:spPr>
+          <a:xfrm>
+            <a:off x="7753036" y="4652290"/>
+            <a:ext cx="614563" cy="353519"/>
+          </a:xfrm>
+          <a:prstGeom prst="rect">
+            <a:avLst/>
+          </a:prstGeom>
+          <a:noFill/>
+          <a:ln>
+            <a:solidFill>
+              <a:schemeClr val="tx1"/>
+            </a:solidFill>
+          </a:ln>
+        </p:spPr>
+        <p:style>
+          <a:lnRef idx="2">
+            <a:schemeClr val="accent6"/>
+          </a:lnRef>
+          <a:fillRef idx="1">
+            <a:schemeClr val="lt1"/>
+          </a:fillRef>
+          <a:effectRef idx="0">
+            <a:schemeClr val="accent6"/>
+          </a:effectRef>
+          <a:fontRef idx="minor">
+            <a:schemeClr val="dk1"/>
+          </a:fontRef>
+        </p:style>
+        <p:txBody>
+          <a:bodyPr rtlCol="0" anchor="ctr"/>
+          <a:lstStyle/>
+          <a:p>
+            <a:pPr algn="ctr"/>
             <a:r>
               <a:rPr lang="es-ES" sz="800" dirty="0" smtClean="0">
                 <a:solidFill>
@@ -2611,7 +3118,7 @@
                 <a:latin typeface="Arial" panose="020B0604020202020204" pitchFamily="34" charset="0"/>
                 <a:cs typeface="Arial" panose="020B0604020202020204" pitchFamily="34" charset="0"/>
               </a:rPr>
-              <a:t>número es divisor de sí mismo</a:t>
+              <a:t>números primos </a:t>
             </a:r>
             <a:endParaRPr lang="es-ES" sz="800" dirty="0">
               <a:solidFill>
@@ -2625,58 +3132,19 @@
       </p:sp>
       <p:sp>
         <p:nvSpPr>
-          <p:cNvPr id="172" name="CuadroTexto 171" descr="Conector entre nodos" title="conector"/>
-          <p:cNvSpPr txBox="1"/>
+          <p:cNvPr id="201" name="Rectángulo 200" descr="Nodo de cuarto nivel&#10;" title="Nodo04"/>
+          <p:cNvSpPr/>
           <p:nvPr/>
         </p:nvSpPr>
         <p:spPr>
           <a:xfrm>
-            <a:off x="4375954" y="4562279"/>
-            <a:ext cx="1117174" cy="215444"/>
+            <a:off x="8270154" y="4081125"/>
+            <a:ext cx="802464" cy="353519"/>
           </a:xfrm>
           <a:prstGeom prst="rect">
             <a:avLst/>
           </a:prstGeom>
           <a:noFill/>
-        </p:spPr>
-        <p:txBody>
-          <a:bodyPr wrap="square" rtlCol="0">
-            <a:spAutoFit/>
-          </a:bodyPr>
-          <a:lstStyle/>
-          <a:p>
-            <a:pPr algn="ctr"/>
-            <a:r>
-              <a:rPr lang="es-ES" sz="800" dirty="0" smtClean="0">
-                <a:latin typeface="Arial" panose="020B0604020202020204" pitchFamily="34" charset="0"/>
-                <a:cs typeface="Arial" panose="020B0604020202020204" pitchFamily="34" charset="0"/>
-              </a:rPr>
-              <a:t>como</a:t>
-            </a:r>
-            <a:endParaRPr lang="es-ES" sz="800" dirty="0">
-              <a:latin typeface="Arial" panose="020B0604020202020204" pitchFamily="34" charset="0"/>
-              <a:cs typeface="Arial" panose="020B0604020202020204" pitchFamily="34" charset="0"/>
-            </a:endParaRPr>
-          </a:p>
-        </p:txBody>
-      </p:sp>
-      <p:sp>
-        <p:nvSpPr>
-          <p:cNvPr id="176" name="Rectángulo 175" descr="Nodo de cuarto nivel&#10;" title="Nodo04"/>
-          <p:cNvSpPr/>
-          <p:nvPr/>
-        </p:nvSpPr>
-        <p:spPr>
-          <a:xfrm>
-            <a:off x="4625520" y="5814820"/>
-            <a:ext cx="646249" cy="576405"/>
-          </a:xfrm>
-          <a:prstGeom prst="rect">
-            <a:avLst/>
-          </a:prstGeom>
-          <a:solidFill>
-            <a:schemeClr val="bg1"/>
-          </a:solidFill>
           <a:ln>
             <a:solidFill>
               <a:schemeClr val="tx1"/>
@@ -2710,8 +3178,134 @@
                 <a:latin typeface="Arial" panose="020B0604020202020204" pitchFamily="34" charset="0"/>
                 <a:cs typeface="Arial" panose="020B0604020202020204" pitchFamily="34" charset="0"/>
               </a:rPr>
-              <a:t>uno </a:t>
-            </a:r>
+              <a:t>números compuestos</a:t>
+            </a:r>
+            <a:endParaRPr lang="es-ES" sz="800" dirty="0">
+              <a:solidFill>
+                <a:schemeClr val="tx1"/>
+              </a:solidFill>
+              <a:latin typeface="Arial" panose="020B0604020202020204" pitchFamily="34" charset="0"/>
+              <a:cs typeface="Arial" panose="020B0604020202020204" pitchFamily="34" charset="0"/>
+            </a:endParaRPr>
+          </a:p>
+        </p:txBody>
+      </p:sp>
+      <p:cxnSp>
+        <p:nvCxnSpPr>
+          <p:cNvPr id="84" name="Conector angular 83"/>
+          <p:cNvCxnSpPr/>
+          <p:nvPr/>
+        </p:nvCxnSpPr>
+        <p:spPr>
+          <a:xfrm rot="5400000">
+            <a:off x="4863467" y="4524587"/>
+            <a:ext cx="143025" cy="876"/>
+          </a:xfrm>
+          <a:prstGeom prst="bentConnector3">
+            <a:avLst>
+              <a:gd name="adj1" fmla="val 50000"/>
+            </a:avLst>
+          </a:prstGeom>
+          <a:ln w="12700">
+            <a:solidFill>
+              <a:schemeClr val="tx1"/>
+            </a:solidFill>
+          </a:ln>
+        </p:spPr>
+        <p:style>
+          <a:lnRef idx="1">
+            <a:schemeClr val="accent1"/>
+          </a:lnRef>
+          <a:fillRef idx="0">
+            <a:schemeClr val="accent1"/>
+          </a:fillRef>
+          <a:effectRef idx="0">
+            <a:schemeClr val="accent1"/>
+          </a:effectRef>
+          <a:fontRef idx="minor">
+            <a:schemeClr val="tx1"/>
+          </a:fontRef>
+        </p:style>
+      </p:cxnSp>
+      <p:cxnSp>
+        <p:nvCxnSpPr>
+          <p:cNvPr id="86" name="Conector angular 85"/>
+          <p:cNvCxnSpPr/>
+          <p:nvPr/>
+        </p:nvCxnSpPr>
+        <p:spPr>
+          <a:xfrm rot="5400000">
+            <a:off x="7278660" y="4521263"/>
+            <a:ext cx="72000" cy="0"/>
+          </a:xfrm>
+          <a:prstGeom prst="bentConnector3">
+            <a:avLst>
+              <a:gd name="adj1" fmla="val 852472"/>
+            </a:avLst>
+          </a:prstGeom>
+          <a:ln w="12700">
+            <a:solidFill>
+              <a:schemeClr val="tx1"/>
+            </a:solidFill>
+          </a:ln>
+        </p:spPr>
+        <p:style>
+          <a:lnRef idx="1">
+            <a:schemeClr val="accent1"/>
+          </a:lnRef>
+          <a:fillRef idx="0">
+            <a:schemeClr val="accent1"/>
+          </a:fillRef>
+          <a:effectRef idx="0">
+            <a:schemeClr val="accent1"/>
+          </a:effectRef>
+          <a:fontRef idx="minor">
+            <a:schemeClr val="tx1"/>
+          </a:fontRef>
+        </p:style>
+      </p:cxnSp>
+      <p:sp>
+        <p:nvSpPr>
+          <p:cNvPr id="92" name="Rectángulo 91" descr="Nodo de cuarto nivel&#10;" title="Nodo04"/>
+          <p:cNvSpPr/>
+          <p:nvPr/>
+        </p:nvSpPr>
+        <p:spPr>
+          <a:xfrm>
+            <a:off x="6651668" y="5500895"/>
+            <a:ext cx="1235721" cy="485362"/>
+          </a:xfrm>
+          <a:prstGeom prst="rect">
+            <a:avLst/>
+          </a:prstGeom>
+          <a:solidFill>
+            <a:schemeClr val="bg1"/>
+          </a:solidFill>
+          <a:ln>
+            <a:solidFill>
+              <a:schemeClr val="tx1"/>
+            </a:solidFill>
+          </a:ln>
+        </p:spPr>
+        <p:style>
+          <a:lnRef idx="2">
+            <a:schemeClr val="accent6"/>
+          </a:lnRef>
+          <a:fillRef idx="1">
+            <a:schemeClr val="lt1"/>
+          </a:fillRef>
+          <a:effectRef idx="0">
+            <a:schemeClr val="accent6"/>
+          </a:effectRef>
+          <a:fontRef idx="minor">
+            <a:schemeClr val="dk1"/>
+          </a:fontRef>
+        </p:style>
+        <p:txBody>
+          <a:bodyPr rtlCol="0" anchor="ctr"/>
+          <a:lstStyle/>
+          <a:p>
+            <a:pPr algn="ctr"/>
             <a:r>
               <a:rPr lang="es-ES" sz="800" dirty="0" smtClean="0">
                 <a:solidFill>
@@ -2720,7 +3314,7 @@
                 <a:latin typeface="Arial" panose="020B0604020202020204" pitchFamily="34" charset="0"/>
                 <a:cs typeface="Arial" panose="020B0604020202020204" pitchFamily="34" charset="0"/>
               </a:rPr>
-              <a:t>es divisor de todos los números</a:t>
+              <a:t>reglas para determinar por inspección si un número es divisible entre otro</a:t>
             </a:r>
             <a:endParaRPr lang="es-ES" sz="800" dirty="0">
               <a:solidFill>
@@ -2734,14 +3328,14 @@
       </p:sp>
       <p:sp>
         <p:nvSpPr>
-          <p:cNvPr id="178" name="CuadroTexto 177" descr="Conector entre nodos" title="conector"/>
+          <p:cNvPr id="93" name="CuadroTexto 92" descr="Conector entre nodos" title="conector"/>
           <p:cNvSpPr txBox="1"/>
           <p:nvPr/>
         </p:nvSpPr>
         <p:spPr>
           <a:xfrm>
-            <a:off x="4490176" y="3800266"/>
-            <a:ext cx="941455" cy="215444"/>
+            <a:off x="6914777" y="5123493"/>
+            <a:ext cx="871361" cy="215444"/>
           </a:xfrm>
           <a:prstGeom prst="rect">
             <a:avLst/>
@@ -2760,7 +3354,7 @@
                 <a:latin typeface="Arial" panose="020B0604020202020204" pitchFamily="34" charset="0"/>
                 <a:cs typeface="Arial" panose="020B0604020202020204" pitchFamily="34" charset="0"/>
               </a:rPr>
-              <a:t>cumplen</a:t>
+              <a:t>que son</a:t>
             </a:r>
             <a:endParaRPr lang="es-ES" sz="800" dirty="0">
               <a:latin typeface="Arial" panose="020B0604020202020204" pitchFamily="34" charset="0"/>
@@ -2771,93 +3365,14 @@
       </p:sp>
       <p:cxnSp>
         <p:nvCxnSpPr>
-          <p:cNvPr id="179" name="Conector angular 178"/>
+          <p:cNvPr id="94" name="Conector angular 93"/>
           <p:cNvCxnSpPr/>
           <p:nvPr/>
         </p:nvCxnSpPr>
         <p:spPr>
-          <a:xfrm rot="10800000" flipV="1">
-            <a:off x="4941786" y="3664531"/>
-            <a:ext cx="1534069" cy="170064"/>
-          </a:xfrm>
-          <a:prstGeom prst="bentConnector2">
-            <a:avLst/>
-          </a:prstGeom>
-          <a:ln w="12700">
-            <a:solidFill>
-              <a:schemeClr val="tx1"/>
-            </a:solidFill>
-          </a:ln>
-        </p:spPr>
-        <p:style>
-          <a:lnRef idx="1">
-            <a:schemeClr val="accent1"/>
-          </a:lnRef>
-          <a:fillRef idx="0">
-            <a:schemeClr val="accent1"/>
-          </a:fillRef>
-          <a:effectRef idx="0">
-            <a:schemeClr val="accent1"/>
-          </a:effectRef>
-          <a:fontRef idx="minor">
-            <a:schemeClr val="tx1"/>
-          </a:fontRef>
-        </p:style>
-      </p:cxnSp>
-      <p:sp>
-        <p:nvSpPr>
-          <p:cNvPr id="180" name="CuadroTexto 179" descr="Conector entre nodos" title="conector"/>
-          <p:cNvSpPr txBox="1"/>
-          <p:nvPr/>
-        </p:nvSpPr>
-        <p:spPr>
-          <a:xfrm>
-            <a:off x="5931256" y="2560938"/>
-            <a:ext cx="1211833" cy="230832"/>
-          </a:xfrm>
-          <a:prstGeom prst="rect">
-            <a:avLst/>
-          </a:prstGeom>
-          <a:noFill/>
-        </p:spPr>
-        <p:txBody>
-          <a:bodyPr wrap="square" rtlCol="0">
-            <a:spAutoFit/>
-          </a:bodyPr>
-          <a:lstStyle/>
-          <a:p>
-            <a:pPr algn="ctr"/>
-            <a:r>
-              <a:rPr lang="es-ES" sz="900" dirty="0" smtClean="0">
-                <a:latin typeface="Arial" panose="020B0604020202020204" pitchFamily="34" charset="0"/>
-                <a:cs typeface="Arial" panose="020B0604020202020204" pitchFamily="34" charset="0"/>
-              </a:rPr>
-              <a:t>que corresponde </a:t>
-            </a:r>
-            <a:r>
-              <a:rPr lang="es-ES" sz="900" dirty="0" smtClean="0">
-                <a:latin typeface="Arial" panose="020B0604020202020204" pitchFamily="34" charset="0"/>
-                <a:cs typeface="Arial" panose="020B0604020202020204" pitchFamily="34" charset="0"/>
-              </a:rPr>
-              <a:t>a </a:t>
-            </a:r>
-            <a:endParaRPr lang="es-ES" sz="900" dirty="0">
-              <a:latin typeface="Arial" panose="020B0604020202020204" pitchFamily="34" charset="0"/>
-              <a:cs typeface="Arial" panose="020B0604020202020204" pitchFamily="34" charset="0"/>
-            </a:endParaRPr>
-          </a:p>
-        </p:txBody>
-      </p:sp>
-      <p:cxnSp>
-        <p:nvCxnSpPr>
-          <p:cNvPr id="181" name="Conector angular 180"/>
-          <p:cNvCxnSpPr/>
-          <p:nvPr/>
-        </p:nvCxnSpPr>
-        <p:spPr>
-          <a:xfrm rot="5400000">
-            <a:off x="6285115" y="2545050"/>
-            <a:ext cx="143025" cy="876"/>
+          <a:xfrm rot="16200000" flipH="1">
+            <a:off x="7245369" y="5427566"/>
+            <a:ext cx="133174" cy="1963"/>
           </a:xfrm>
           <a:prstGeom prst="bentConnector3">
             <a:avLst>
@@ -2887,14 +3402,14 @@
       </p:cxnSp>
       <p:sp>
         <p:nvSpPr>
-          <p:cNvPr id="183" name="Rectángulo 182" descr="Nodo de cuarto nivel&#10;" title="Nodo04"/>
+          <p:cNvPr id="96" name="Rectángulo 95" descr="Nodo de cuarto nivel&#10;" title="Nodo04"/>
           <p:cNvSpPr/>
           <p:nvPr/>
         </p:nvSpPr>
         <p:spPr>
           <a:xfrm>
-            <a:off x="5475252" y="5427423"/>
-            <a:ext cx="805968" cy="576404"/>
+            <a:off x="7143089" y="6083278"/>
+            <a:ext cx="1148200" cy="521369"/>
           </a:xfrm>
           <a:prstGeom prst="rect">
             <a:avLst/>
@@ -2935,8 +3450,97 @@
                 <a:latin typeface="Arial" panose="020B0604020202020204" pitchFamily="34" charset="0"/>
                 <a:cs typeface="Arial" panose="020B0604020202020204" pitchFamily="34" charset="0"/>
               </a:rPr>
-              <a:t>los </a:t>
-            </a:r>
+              <a:t>números que tienen dos divisores diferentes; 1 y él mismo</a:t>
+            </a:r>
+            <a:endParaRPr lang="es-ES" sz="800" dirty="0">
+              <a:solidFill>
+                <a:schemeClr val="tx1"/>
+              </a:solidFill>
+              <a:latin typeface="Arial" panose="020B0604020202020204" pitchFamily="34" charset="0"/>
+              <a:cs typeface="Arial" panose="020B0604020202020204" pitchFamily="34" charset="0"/>
+            </a:endParaRPr>
+          </a:p>
+        </p:txBody>
+      </p:sp>
+      <p:sp>
+        <p:nvSpPr>
+          <p:cNvPr id="97" name="CuadroTexto 96" descr="Conector entre nodos" title="conector"/>
+          <p:cNvSpPr txBox="1"/>
+          <p:nvPr/>
+        </p:nvSpPr>
+        <p:spPr>
+          <a:xfrm>
+            <a:off x="7509838" y="5096437"/>
+            <a:ext cx="1117174" cy="215444"/>
+          </a:xfrm>
+          <a:prstGeom prst="rect">
+            <a:avLst/>
+          </a:prstGeom>
+          <a:noFill/>
+        </p:spPr>
+        <p:txBody>
+          <a:bodyPr wrap="square" rtlCol="0">
+            <a:spAutoFit/>
+          </a:bodyPr>
+          <a:lstStyle/>
+          <a:p>
+            <a:pPr algn="ctr"/>
+            <a:r>
+              <a:rPr lang="es-ES" sz="800" dirty="0" smtClean="0">
+                <a:latin typeface="Arial" panose="020B0604020202020204" pitchFamily="34" charset="0"/>
+                <a:cs typeface="Arial" panose="020B0604020202020204" pitchFamily="34" charset="0"/>
+              </a:rPr>
+              <a:t>corresponden a</a:t>
+            </a:r>
+            <a:endParaRPr lang="es-ES" sz="800" dirty="0">
+              <a:latin typeface="Arial" panose="020B0604020202020204" pitchFamily="34" charset="0"/>
+              <a:cs typeface="Arial" panose="020B0604020202020204" pitchFamily="34" charset="0"/>
+            </a:endParaRPr>
+          </a:p>
+        </p:txBody>
+      </p:sp>
+      <p:sp>
+        <p:nvSpPr>
+          <p:cNvPr id="100" name="Rectángulo 99" descr="Nodo de cuarto nivel&#10;" title="Nodo04"/>
+          <p:cNvSpPr/>
+          <p:nvPr/>
+        </p:nvSpPr>
+        <p:spPr>
+          <a:xfrm>
+            <a:off x="8376180" y="5361284"/>
+            <a:ext cx="694923" cy="873600"/>
+          </a:xfrm>
+          <a:prstGeom prst="rect">
+            <a:avLst/>
+          </a:prstGeom>
+          <a:solidFill>
+            <a:schemeClr val="bg1"/>
+          </a:solidFill>
+          <a:ln>
+            <a:solidFill>
+              <a:schemeClr val="tx1"/>
+            </a:solidFill>
+          </a:ln>
+        </p:spPr>
+        <p:style>
+          <a:lnRef idx="2">
+            <a:schemeClr val="accent6"/>
+          </a:lnRef>
+          <a:fillRef idx="1">
+            <a:schemeClr val="lt1"/>
+          </a:fillRef>
+          <a:effectRef idx="0">
+            <a:schemeClr val="accent6"/>
+          </a:effectRef>
+          <a:fontRef idx="minor">
+            <a:schemeClr val="dk1"/>
+          </a:fontRef>
+        </p:style>
+        <p:txBody>
+          <a:bodyPr rtlCol="0" anchor="ctr"/>
+          <a:lstStyle/>
+          <a:p>
+            <a:pPr algn="ctr"/>
             <a:r>
               <a:rPr lang="es-ES" sz="800" dirty="0" smtClean="0">
                 <a:solidFill>
@@ -2945,782 +3549,7 @@
                 <a:latin typeface="Arial" panose="020B0604020202020204" pitchFamily="34" charset="0"/>
                 <a:cs typeface="Arial" panose="020B0604020202020204" pitchFamily="34" charset="0"/>
               </a:rPr>
-              <a:t>divisores de un número son finitos</a:t>
-            </a:r>
-            <a:endParaRPr lang="es-ES" sz="800" dirty="0">
-              <a:solidFill>
-                <a:schemeClr val="tx1"/>
-              </a:solidFill>
-              <a:latin typeface="Arial" panose="020B0604020202020204" pitchFamily="34" charset="0"/>
-              <a:cs typeface="Arial" panose="020B0604020202020204" pitchFamily="34" charset="0"/>
-            </a:endParaRPr>
-          </a:p>
-        </p:txBody>
-      </p:sp>
-      <p:cxnSp>
-        <p:nvCxnSpPr>
-          <p:cNvPr id="186" name="Conector angular 185"/>
-          <p:cNvCxnSpPr/>
-          <p:nvPr/>
-        </p:nvCxnSpPr>
-        <p:spPr>
-          <a:xfrm rot="5400000">
-            <a:off x="6285114" y="2824331"/>
-            <a:ext cx="143025" cy="876"/>
-          </a:xfrm>
-          <a:prstGeom prst="bentConnector3">
-            <a:avLst>
-              <a:gd name="adj1" fmla="val 50000"/>
-            </a:avLst>
-          </a:prstGeom>
-          <a:ln w="12700">
-            <a:solidFill>
-              <a:schemeClr val="tx1"/>
-            </a:solidFill>
-          </a:ln>
-        </p:spPr>
-        <p:style>
-          <a:lnRef idx="1">
-            <a:schemeClr val="accent1"/>
-          </a:lnRef>
-          <a:fillRef idx="0">
-            <a:schemeClr val="accent1"/>
-          </a:fillRef>
-          <a:effectRef idx="0">
-            <a:schemeClr val="accent1"/>
-          </a:effectRef>
-          <a:fontRef idx="minor">
-            <a:schemeClr val="tx1"/>
-          </a:fontRef>
-        </p:style>
-      </p:cxnSp>
-      <p:sp>
-        <p:nvSpPr>
-          <p:cNvPr id="187" name="Rectángulo 186" descr="Nodo de tercer nivel" title="Nodo03"/>
-          <p:cNvSpPr/>
-          <p:nvPr/>
-        </p:nvSpPr>
-        <p:spPr>
-          <a:xfrm>
-            <a:off x="5626907" y="4841695"/>
-            <a:ext cx="1234800" cy="374902"/>
-          </a:xfrm>
-          <a:prstGeom prst="rect">
-            <a:avLst/>
-          </a:prstGeom>
-          <a:noFill/>
-          <a:ln>
-            <a:solidFill>
-              <a:schemeClr val="tx1"/>
-            </a:solidFill>
-          </a:ln>
-        </p:spPr>
-        <p:style>
-          <a:lnRef idx="2">
-            <a:schemeClr val="accent6"/>
-          </a:lnRef>
-          <a:fillRef idx="1">
-            <a:schemeClr val="lt1"/>
-          </a:fillRef>
-          <a:effectRef idx="0">
-            <a:schemeClr val="accent6"/>
-          </a:effectRef>
-          <a:fontRef idx="minor">
-            <a:schemeClr val="dk1"/>
-          </a:fontRef>
-        </p:style>
-        <p:txBody>
-          <a:bodyPr rtlCol="0" anchor="ctr"/>
-          <a:lstStyle/>
-          <a:p>
-            <a:pPr algn="ctr"/>
-            <a:r>
-              <a:rPr lang="es-ES" sz="750" dirty="0" smtClean="0">
-                <a:solidFill>
-                  <a:schemeClr val="tx1"/>
-                </a:solidFill>
-                <a:latin typeface="Arial" panose="020B0604020202020204" pitchFamily="34" charset="0"/>
-                <a:cs typeface="Arial" panose="020B0604020202020204" pitchFamily="34" charset="0"/>
-              </a:rPr>
-              <a:t>el </a:t>
-            </a:r>
-            <a:r>
-              <a:rPr lang="es-ES" sz="750" dirty="0" smtClean="0">
-                <a:solidFill>
-                  <a:schemeClr val="tx1"/>
-                </a:solidFill>
-                <a:latin typeface="Arial" panose="020B0604020202020204" pitchFamily="34" charset="0"/>
-                <a:cs typeface="Arial" panose="020B0604020202020204" pitchFamily="34" charset="0"/>
-              </a:rPr>
-              <a:t>mayor de los divisores comunes entre dos o más números </a:t>
-            </a:r>
-            <a:endParaRPr lang="es-ES" sz="750" dirty="0">
-              <a:solidFill>
-                <a:schemeClr val="tx1"/>
-              </a:solidFill>
-              <a:latin typeface="Arial" panose="020B0604020202020204" pitchFamily="34" charset="0"/>
-              <a:cs typeface="Arial" panose="020B0604020202020204" pitchFamily="34" charset="0"/>
-            </a:endParaRPr>
-          </a:p>
-        </p:txBody>
-      </p:sp>
-      <p:cxnSp>
-        <p:nvCxnSpPr>
-          <p:cNvPr id="188" name="Conector angular 187"/>
-          <p:cNvCxnSpPr/>
-          <p:nvPr/>
-        </p:nvCxnSpPr>
-        <p:spPr>
-          <a:xfrm rot="5400000">
-            <a:off x="6284237" y="3613307"/>
-            <a:ext cx="143025" cy="876"/>
-          </a:xfrm>
-          <a:prstGeom prst="bentConnector3">
-            <a:avLst>
-              <a:gd name="adj1" fmla="val 50000"/>
-            </a:avLst>
-          </a:prstGeom>
-          <a:ln w="12700">
-            <a:solidFill>
-              <a:schemeClr val="tx1"/>
-            </a:solidFill>
-          </a:ln>
-        </p:spPr>
-        <p:style>
-          <a:lnRef idx="1">
-            <a:schemeClr val="accent1"/>
-          </a:lnRef>
-          <a:fillRef idx="0">
-            <a:schemeClr val="accent1"/>
-          </a:fillRef>
-          <a:effectRef idx="0">
-            <a:schemeClr val="accent1"/>
-          </a:effectRef>
-          <a:fontRef idx="minor">
-            <a:schemeClr val="tx1"/>
-          </a:fontRef>
-        </p:style>
-      </p:cxnSp>
-      <p:sp>
-        <p:nvSpPr>
-          <p:cNvPr id="194" name="Rectángulo 193" descr="Nodo de cuarto nivel&#10;" title="Nodo04"/>
-          <p:cNvSpPr/>
-          <p:nvPr/>
-        </p:nvSpPr>
-        <p:spPr>
-          <a:xfrm>
-            <a:off x="6904760" y="4122654"/>
-            <a:ext cx="812429" cy="353519"/>
-          </a:xfrm>
-          <a:prstGeom prst="rect">
-            <a:avLst/>
-          </a:prstGeom>
-          <a:noFill/>
-          <a:ln>
-            <a:solidFill>
-              <a:schemeClr val="tx1"/>
-            </a:solidFill>
-          </a:ln>
-        </p:spPr>
-        <p:style>
-          <a:lnRef idx="2">
-            <a:schemeClr val="accent6"/>
-          </a:lnRef>
-          <a:fillRef idx="1">
-            <a:schemeClr val="lt1"/>
-          </a:fillRef>
-          <a:effectRef idx="0">
-            <a:schemeClr val="accent6"/>
-          </a:effectRef>
-          <a:fontRef idx="minor">
-            <a:schemeClr val="dk1"/>
-          </a:fontRef>
-        </p:style>
-        <p:txBody>
-          <a:bodyPr rtlCol="0" anchor="ctr"/>
-          <a:lstStyle/>
-          <a:p>
-            <a:pPr algn="ctr"/>
-            <a:r>
-              <a:rPr lang="es-ES" sz="800" dirty="0" smtClean="0">
-                <a:solidFill>
-                  <a:schemeClr val="tx1"/>
-                </a:solidFill>
-                <a:latin typeface="Arial" panose="020B0604020202020204" pitchFamily="34" charset="0"/>
-                <a:cs typeface="Arial" panose="020B0604020202020204" pitchFamily="34" charset="0"/>
-              </a:rPr>
-              <a:t>criterios </a:t>
-            </a:r>
-            <a:r>
-              <a:rPr lang="es-ES" sz="800" dirty="0" smtClean="0">
-                <a:solidFill>
-                  <a:schemeClr val="tx1"/>
-                </a:solidFill>
-                <a:latin typeface="Arial" panose="020B0604020202020204" pitchFamily="34" charset="0"/>
-                <a:cs typeface="Arial" panose="020B0604020202020204" pitchFamily="34" charset="0"/>
-              </a:rPr>
-              <a:t>de divisibilidad</a:t>
-            </a:r>
-            <a:endParaRPr lang="es-ES" sz="800" dirty="0">
-              <a:solidFill>
-                <a:schemeClr val="tx1"/>
-              </a:solidFill>
-              <a:latin typeface="Arial" panose="020B0604020202020204" pitchFamily="34" charset="0"/>
-              <a:cs typeface="Arial" panose="020B0604020202020204" pitchFamily="34" charset="0"/>
-            </a:endParaRPr>
-          </a:p>
-        </p:txBody>
-      </p:sp>
-      <p:sp>
-        <p:nvSpPr>
-          <p:cNvPr id="199" name="Rectángulo 198" descr="Nodo de cuarto nivel&#10;" title="Nodo04"/>
-          <p:cNvSpPr/>
-          <p:nvPr/>
-        </p:nvSpPr>
-        <p:spPr>
-          <a:xfrm>
-            <a:off x="7753036" y="4652290"/>
-            <a:ext cx="614563" cy="353519"/>
-          </a:xfrm>
-          <a:prstGeom prst="rect">
-            <a:avLst/>
-          </a:prstGeom>
-          <a:noFill/>
-          <a:ln>
-            <a:solidFill>
-              <a:schemeClr val="tx1"/>
-            </a:solidFill>
-          </a:ln>
-        </p:spPr>
-        <p:style>
-          <a:lnRef idx="2">
-            <a:schemeClr val="accent6"/>
-          </a:lnRef>
-          <a:fillRef idx="1">
-            <a:schemeClr val="lt1"/>
-          </a:fillRef>
-          <a:effectRef idx="0">
-            <a:schemeClr val="accent6"/>
-          </a:effectRef>
-          <a:fontRef idx="minor">
-            <a:schemeClr val="dk1"/>
-          </a:fontRef>
-        </p:style>
-        <p:txBody>
-          <a:bodyPr rtlCol="0" anchor="ctr"/>
-          <a:lstStyle/>
-          <a:p>
-            <a:pPr algn="ctr"/>
-            <a:r>
-              <a:rPr lang="es-ES" sz="800" dirty="0" smtClean="0">
-                <a:solidFill>
-                  <a:schemeClr val="tx1"/>
-                </a:solidFill>
-                <a:latin typeface="Arial" panose="020B0604020202020204" pitchFamily="34" charset="0"/>
-                <a:cs typeface="Arial" panose="020B0604020202020204" pitchFamily="34" charset="0"/>
-              </a:rPr>
-              <a:t>números </a:t>
-            </a:r>
-            <a:r>
-              <a:rPr lang="es-ES" sz="800" dirty="0" smtClean="0">
-                <a:solidFill>
-                  <a:schemeClr val="tx1"/>
-                </a:solidFill>
-                <a:latin typeface="Arial" panose="020B0604020202020204" pitchFamily="34" charset="0"/>
-                <a:cs typeface="Arial" panose="020B0604020202020204" pitchFamily="34" charset="0"/>
-              </a:rPr>
-              <a:t>primos </a:t>
-            </a:r>
-            <a:endParaRPr lang="es-ES" sz="800" dirty="0">
-              <a:solidFill>
-                <a:schemeClr val="tx1"/>
-              </a:solidFill>
-              <a:latin typeface="Arial" panose="020B0604020202020204" pitchFamily="34" charset="0"/>
-              <a:cs typeface="Arial" panose="020B0604020202020204" pitchFamily="34" charset="0"/>
-            </a:endParaRPr>
-          </a:p>
-        </p:txBody>
-      </p:sp>
-      <p:sp>
-        <p:nvSpPr>
-          <p:cNvPr id="201" name="Rectángulo 200" descr="Nodo de cuarto nivel&#10;" title="Nodo04"/>
-          <p:cNvSpPr/>
-          <p:nvPr/>
-        </p:nvSpPr>
-        <p:spPr>
-          <a:xfrm>
-            <a:off x="8270154" y="4081125"/>
-            <a:ext cx="802464" cy="353519"/>
-          </a:xfrm>
-          <a:prstGeom prst="rect">
-            <a:avLst/>
-          </a:prstGeom>
-          <a:noFill/>
-          <a:ln>
-            <a:solidFill>
-              <a:schemeClr val="tx1"/>
-            </a:solidFill>
-          </a:ln>
-        </p:spPr>
-        <p:style>
-          <a:lnRef idx="2">
-            <a:schemeClr val="accent6"/>
-          </a:lnRef>
-          <a:fillRef idx="1">
-            <a:schemeClr val="lt1"/>
-          </a:fillRef>
-          <a:effectRef idx="0">
-            <a:schemeClr val="accent6"/>
-          </a:effectRef>
-          <a:fontRef idx="minor">
-            <a:schemeClr val="dk1"/>
-          </a:fontRef>
-        </p:style>
-        <p:txBody>
-          <a:bodyPr rtlCol="0" anchor="ctr"/>
-          <a:lstStyle/>
-          <a:p>
-            <a:pPr algn="ctr"/>
-            <a:r>
-              <a:rPr lang="es-ES" sz="800" dirty="0" smtClean="0">
-                <a:solidFill>
-                  <a:schemeClr val="tx1"/>
-                </a:solidFill>
-                <a:latin typeface="Arial" panose="020B0604020202020204" pitchFamily="34" charset="0"/>
-                <a:cs typeface="Arial" panose="020B0604020202020204" pitchFamily="34" charset="0"/>
-              </a:rPr>
-              <a:t>números </a:t>
-            </a:r>
-            <a:r>
-              <a:rPr lang="es-ES" sz="800" dirty="0" smtClean="0">
-                <a:solidFill>
-                  <a:schemeClr val="tx1"/>
-                </a:solidFill>
-                <a:latin typeface="Arial" panose="020B0604020202020204" pitchFamily="34" charset="0"/>
-                <a:cs typeface="Arial" panose="020B0604020202020204" pitchFamily="34" charset="0"/>
-              </a:rPr>
-              <a:t>compuestos</a:t>
-            </a:r>
-            <a:endParaRPr lang="es-ES" sz="800" dirty="0">
-              <a:solidFill>
-                <a:schemeClr val="tx1"/>
-              </a:solidFill>
-              <a:latin typeface="Arial" panose="020B0604020202020204" pitchFamily="34" charset="0"/>
-              <a:cs typeface="Arial" panose="020B0604020202020204" pitchFamily="34" charset="0"/>
-            </a:endParaRPr>
-          </a:p>
-        </p:txBody>
-      </p:sp>
-      <p:cxnSp>
-        <p:nvCxnSpPr>
-          <p:cNvPr id="84" name="Conector angular 83"/>
-          <p:cNvCxnSpPr/>
-          <p:nvPr/>
-        </p:nvCxnSpPr>
-        <p:spPr>
-          <a:xfrm rot="5400000">
-            <a:off x="4863467" y="4524587"/>
-            <a:ext cx="143025" cy="876"/>
-          </a:xfrm>
-          <a:prstGeom prst="bentConnector3">
-            <a:avLst>
-              <a:gd name="adj1" fmla="val 50000"/>
-            </a:avLst>
-          </a:prstGeom>
-          <a:ln w="12700">
-            <a:solidFill>
-              <a:schemeClr val="tx1"/>
-            </a:solidFill>
-          </a:ln>
-        </p:spPr>
-        <p:style>
-          <a:lnRef idx="1">
-            <a:schemeClr val="accent1"/>
-          </a:lnRef>
-          <a:fillRef idx="0">
-            <a:schemeClr val="accent1"/>
-          </a:fillRef>
-          <a:effectRef idx="0">
-            <a:schemeClr val="accent1"/>
-          </a:effectRef>
-          <a:fontRef idx="minor">
-            <a:schemeClr val="tx1"/>
-          </a:fontRef>
-        </p:style>
-      </p:cxnSp>
-      <p:cxnSp>
-        <p:nvCxnSpPr>
-          <p:cNvPr id="86" name="Conector angular 85"/>
-          <p:cNvCxnSpPr/>
-          <p:nvPr/>
-        </p:nvCxnSpPr>
-        <p:spPr>
-          <a:xfrm rot="5400000">
-            <a:off x="7278660" y="4521263"/>
-            <a:ext cx="72000" cy="0"/>
-          </a:xfrm>
-          <a:prstGeom prst="bentConnector3">
-            <a:avLst>
-              <a:gd name="adj1" fmla="val 852472"/>
-            </a:avLst>
-          </a:prstGeom>
-          <a:ln w="12700">
-            <a:solidFill>
-              <a:schemeClr val="tx1"/>
-            </a:solidFill>
-          </a:ln>
-        </p:spPr>
-        <p:style>
-          <a:lnRef idx="1">
-            <a:schemeClr val="accent1"/>
-          </a:lnRef>
-          <a:fillRef idx="0">
-            <a:schemeClr val="accent1"/>
-          </a:fillRef>
-          <a:effectRef idx="0">
-            <a:schemeClr val="accent1"/>
-          </a:effectRef>
-          <a:fontRef idx="minor">
-            <a:schemeClr val="tx1"/>
-          </a:fontRef>
-        </p:style>
-      </p:cxnSp>
-      <p:sp>
-        <p:nvSpPr>
-          <p:cNvPr id="92" name="Rectángulo 91" descr="Nodo de cuarto nivel&#10;" title="Nodo04"/>
-          <p:cNvSpPr/>
-          <p:nvPr/>
-        </p:nvSpPr>
-        <p:spPr>
-          <a:xfrm>
-            <a:off x="6651668" y="5500895"/>
-            <a:ext cx="1235721" cy="485362"/>
-          </a:xfrm>
-          <a:prstGeom prst="rect">
-            <a:avLst/>
-          </a:prstGeom>
-          <a:solidFill>
-            <a:schemeClr val="bg1"/>
-          </a:solidFill>
-          <a:ln>
-            <a:solidFill>
-              <a:schemeClr val="tx1"/>
-            </a:solidFill>
-          </a:ln>
-        </p:spPr>
-        <p:style>
-          <a:lnRef idx="2">
-            <a:schemeClr val="accent6"/>
-          </a:lnRef>
-          <a:fillRef idx="1">
-            <a:schemeClr val="lt1"/>
-          </a:fillRef>
-          <a:effectRef idx="0">
-            <a:schemeClr val="accent6"/>
-          </a:effectRef>
-          <a:fontRef idx="minor">
-            <a:schemeClr val="dk1"/>
-          </a:fontRef>
-        </p:style>
-        <p:txBody>
-          <a:bodyPr rtlCol="0" anchor="ctr"/>
-          <a:lstStyle/>
-          <a:p>
-            <a:pPr algn="ctr"/>
-            <a:r>
-              <a:rPr lang="es-ES" sz="800" dirty="0" smtClean="0">
-                <a:solidFill>
-                  <a:schemeClr val="tx1"/>
-                </a:solidFill>
-                <a:latin typeface="Arial" panose="020B0604020202020204" pitchFamily="34" charset="0"/>
-                <a:cs typeface="Arial" panose="020B0604020202020204" pitchFamily="34" charset="0"/>
-              </a:rPr>
-              <a:t>reglas </a:t>
-            </a:r>
-            <a:r>
-              <a:rPr lang="es-ES" sz="800" dirty="0" smtClean="0">
-                <a:solidFill>
-                  <a:schemeClr val="tx1"/>
-                </a:solidFill>
-                <a:latin typeface="Arial" panose="020B0604020202020204" pitchFamily="34" charset="0"/>
-                <a:cs typeface="Arial" panose="020B0604020202020204" pitchFamily="34" charset="0"/>
-              </a:rPr>
-              <a:t>para determinar por inspección si un número es divisible entre otro</a:t>
-            </a:r>
-            <a:endParaRPr lang="es-ES" sz="800" dirty="0">
-              <a:solidFill>
-                <a:schemeClr val="tx1"/>
-              </a:solidFill>
-              <a:latin typeface="Arial" panose="020B0604020202020204" pitchFamily="34" charset="0"/>
-              <a:cs typeface="Arial" panose="020B0604020202020204" pitchFamily="34" charset="0"/>
-            </a:endParaRPr>
-          </a:p>
-        </p:txBody>
-      </p:sp>
-      <p:sp>
-        <p:nvSpPr>
-          <p:cNvPr id="93" name="CuadroTexto 92" descr="Conector entre nodos" title="conector"/>
-          <p:cNvSpPr txBox="1"/>
-          <p:nvPr/>
-        </p:nvSpPr>
-        <p:spPr>
-          <a:xfrm>
-            <a:off x="6914777" y="5123493"/>
-            <a:ext cx="871361" cy="215444"/>
-          </a:xfrm>
-          <a:prstGeom prst="rect">
-            <a:avLst/>
-          </a:prstGeom>
-          <a:noFill/>
-        </p:spPr>
-        <p:txBody>
-          <a:bodyPr wrap="square" rtlCol="0">
-            <a:spAutoFit/>
-          </a:bodyPr>
-          <a:lstStyle/>
-          <a:p>
-            <a:pPr algn="ctr"/>
-            <a:r>
-              <a:rPr lang="es-ES" sz="800" dirty="0" smtClean="0">
-                <a:latin typeface="Arial" panose="020B0604020202020204" pitchFamily="34" charset="0"/>
-                <a:cs typeface="Arial" panose="020B0604020202020204" pitchFamily="34" charset="0"/>
-              </a:rPr>
-              <a:t>que son</a:t>
-            </a:r>
-            <a:endParaRPr lang="es-ES" sz="800" dirty="0">
-              <a:latin typeface="Arial" panose="020B0604020202020204" pitchFamily="34" charset="0"/>
-              <a:cs typeface="Arial" panose="020B0604020202020204" pitchFamily="34" charset="0"/>
-            </a:endParaRPr>
-          </a:p>
-        </p:txBody>
-      </p:sp>
-      <p:cxnSp>
-        <p:nvCxnSpPr>
-          <p:cNvPr id="94" name="Conector angular 93"/>
-          <p:cNvCxnSpPr/>
-          <p:nvPr/>
-        </p:nvCxnSpPr>
-        <p:spPr>
-          <a:xfrm rot="16200000" flipH="1">
-            <a:off x="7245369" y="5427566"/>
-            <a:ext cx="133174" cy="1963"/>
-          </a:xfrm>
-          <a:prstGeom prst="bentConnector3">
-            <a:avLst>
-              <a:gd name="adj1" fmla="val 50000"/>
-            </a:avLst>
-          </a:prstGeom>
-          <a:ln w="12700">
-            <a:solidFill>
-              <a:schemeClr val="tx1"/>
-            </a:solidFill>
-          </a:ln>
-        </p:spPr>
-        <p:style>
-          <a:lnRef idx="1">
-            <a:schemeClr val="accent1"/>
-          </a:lnRef>
-          <a:fillRef idx="0">
-            <a:schemeClr val="accent1"/>
-          </a:fillRef>
-          <a:effectRef idx="0">
-            <a:schemeClr val="accent1"/>
-          </a:effectRef>
-          <a:fontRef idx="minor">
-            <a:schemeClr val="tx1"/>
-          </a:fontRef>
-        </p:style>
-      </p:cxnSp>
-      <p:sp>
-        <p:nvSpPr>
-          <p:cNvPr id="96" name="Rectángulo 95" descr="Nodo de cuarto nivel&#10;" title="Nodo04"/>
-          <p:cNvSpPr/>
-          <p:nvPr/>
-        </p:nvSpPr>
-        <p:spPr>
-          <a:xfrm>
-            <a:off x="7143089" y="6083278"/>
-            <a:ext cx="1148200" cy="521369"/>
-          </a:xfrm>
-          <a:prstGeom prst="rect">
-            <a:avLst/>
-          </a:prstGeom>
-          <a:solidFill>
-            <a:schemeClr val="bg1"/>
-          </a:solidFill>
-          <a:ln>
-            <a:solidFill>
-              <a:schemeClr val="tx1"/>
-            </a:solidFill>
-          </a:ln>
-        </p:spPr>
-        <p:style>
-          <a:lnRef idx="2">
-            <a:schemeClr val="accent6"/>
-          </a:lnRef>
-          <a:fillRef idx="1">
-            <a:schemeClr val="lt1"/>
-          </a:fillRef>
-          <a:effectRef idx="0">
-            <a:schemeClr val="accent6"/>
-          </a:effectRef>
-          <a:fontRef idx="minor">
-            <a:schemeClr val="dk1"/>
-          </a:fontRef>
-        </p:style>
-        <p:txBody>
-          <a:bodyPr rtlCol="0" anchor="ctr"/>
-          <a:lstStyle/>
-          <a:p>
-            <a:pPr algn="ctr"/>
-            <a:r>
-              <a:rPr lang="es-ES" sz="800" dirty="0" smtClean="0">
-                <a:solidFill>
-                  <a:schemeClr val="tx1"/>
-                </a:solidFill>
-                <a:latin typeface="Arial" panose="020B0604020202020204" pitchFamily="34" charset="0"/>
-                <a:cs typeface="Arial" panose="020B0604020202020204" pitchFamily="34" charset="0"/>
-              </a:rPr>
-              <a:t>números </a:t>
-            </a:r>
-            <a:r>
-              <a:rPr lang="es-ES" sz="800" dirty="0" smtClean="0">
-                <a:solidFill>
-                  <a:schemeClr val="tx1"/>
-                </a:solidFill>
-                <a:latin typeface="Arial" panose="020B0604020202020204" pitchFamily="34" charset="0"/>
-                <a:cs typeface="Arial" panose="020B0604020202020204" pitchFamily="34" charset="0"/>
-              </a:rPr>
-              <a:t>que tienen dos </a:t>
-            </a:r>
-            <a:r>
-              <a:rPr lang="es-ES" sz="800" dirty="0" smtClean="0">
-                <a:solidFill>
-                  <a:schemeClr val="tx1"/>
-                </a:solidFill>
-                <a:latin typeface="Arial" panose="020B0604020202020204" pitchFamily="34" charset="0"/>
-                <a:cs typeface="Arial" panose="020B0604020202020204" pitchFamily="34" charset="0"/>
-              </a:rPr>
-              <a:t>divisores diferentes; </a:t>
-            </a:r>
-            <a:r>
-              <a:rPr lang="es-ES" sz="800" dirty="0" smtClean="0">
-                <a:solidFill>
-                  <a:schemeClr val="tx1"/>
-                </a:solidFill>
-                <a:latin typeface="Arial" panose="020B0604020202020204" pitchFamily="34" charset="0"/>
-                <a:cs typeface="Arial" panose="020B0604020202020204" pitchFamily="34" charset="0"/>
-              </a:rPr>
-              <a:t>1 y él mismo</a:t>
-            </a:r>
-            <a:endParaRPr lang="es-ES" sz="800" dirty="0">
-              <a:solidFill>
-                <a:schemeClr val="tx1"/>
-              </a:solidFill>
-              <a:latin typeface="Arial" panose="020B0604020202020204" pitchFamily="34" charset="0"/>
-              <a:cs typeface="Arial" panose="020B0604020202020204" pitchFamily="34" charset="0"/>
-            </a:endParaRPr>
-          </a:p>
-        </p:txBody>
-      </p:sp>
-      <p:sp>
-        <p:nvSpPr>
-          <p:cNvPr id="97" name="CuadroTexto 96" descr="Conector entre nodos" title="conector"/>
-          <p:cNvSpPr txBox="1"/>
-          <p:nvPr/>
-        </p:nvSpPr>
-        <p:spPr>
-          <a:xfrm>
-            <a:off x="7509838" y="5096437"/>
-            <a:ext cx="1117174" cy="215444"/>
-          </a:xfrm>
-          <a:prstGeom prst="rect">
-            <a:avLst/>
-          </a:prstGeom>
-          <a:noFill/>
-        </p:spPr>
-        <p:txBody>
-          <a:bodyPr wrap="square" rtlCol="0">
-            <a:spAutoFit/>
-          </a:bodyPr>
-          <a:lstStyle/>
-          <a:p>
-            <a:pPr algn="ctr"/>
-            <a:r>
-              <a:rPr lang="es-ES" sz="800" dirty="0" smtClean="0">
-                <a:latin typeface="Arial" panose="020B0604020202020204" pitchFamily="34" charset="0"/>
-                <a:cs typeface="Arial" panose="020B0604020202020204" pitchFamily="34" charset="0"/>
-              </a:rPr>
-              <a:t>corresponden a</a:t>
-            </a:r>
-            <a:endParaRPr lang="es-ES" sz="800" dirty="0">
-              <a:latin typeface="Arial" panose="020B0604020202020204" pitchFamily="34" charset="0"/>
-              <a:cs typeface="Arial" panose="020B0604020202020204" pitchFamily="34" charset="0"/>
-            </a:endParaRPr>
-          </a:p>
-        </p:txBody>
-      </p:sp>
-      <p:sp>
-        <p:nvSpPr>
-          <p:cNvPr id="100" name="Rectángulo 99" descr="Nodo de cuarto nivel&#10;" title="Nodo04"/>
-          <p:cNvSpPr/>
-          <p:nvPr/>
-        </p:nvSpPr>
-        <p:spPr>
-          <a:xfrm>
-            <a:off x="8376180" y="5361284"/>
-            <a:ext cx="694923" cy="873600"/>
-          </a:xfrm>
-          <a:prstGeom prst="rect">
-            <a:avLst/>
-          </a:prstGeom>
-          <a:solidFill>
-            <a:schemeClr val="bg1"/>
-          </a:solidFill>
-          <a:ln>
-            <a:solidFill>
-              <a:schemeClr val="tx1"/>
-            </a:solidFill>
-          </a:ln>
-        </p:spPr>
-        <p:style>
-          <a:lnRef idx="2">
-            <a:schemeClr val="accent6"/>
-          </a:lnRef>
-          <a:fillRef idx="1">
-            <a:schemeClr val="lt1"/>
-          </a:fillRef>
-          <a:effectRef idx="0">
-            <a:schemeClr val="accent6"/>
-          </a:effectRef>
-          <a:fontRef idx="minor">
-            <a:schemeClr val="dk1"/>
-          </a:fontRef>
-        </p:style>
-        <p:txBody>
-          <a:bodyPr rtlCol="0" anchor="ctr"/>
-          <a:lstStyle/>
-          <a:p>
-            <a:pPr algn="ctr"/>
-            <a:r>
-              <a:rPr lang="es-ES" sz="800" dirty="0" smtClean="0">
-                <a:solidFill>
-                  <a:schemeClr val="tx1"/>
-                </a:solidFill>
-                <a:latin typeface="Arial" panose="020B0604020202020204" pitchFamily="34" charset="0"/>
-                <a:cs typeface="Arial" panose="020B0604020202020204" pitchFamily="34" charset="0"/>
-              </a:rPr>
-              <a:t>números </a:t>
-            </a:r>
-            <a:r>
-              <a:rPr lang="es-ES" sz="800" dirty="0" smtClean="0">
-                <a:solidFill>
-                  <a:schemeClr val="tx1"/>
-                </a:solidFill>
-                <a:latin typeface="Arial" panose="020B0604020202020204" pitchFamily="34" charset="0"/>
-                <a:cs typeface="Arial" panose="020B0604020202020204" pitchFamily="34" charset="0"/>
-              </a:rPr>
-              <a:t>que tienen más de dos divisores diferentes</a:t>
+              <a:t>números que tienen más de dos divisores diferentes</a:t>
             </a:r>
             <a:endParaRPr lang="es-ES" sz="800" dirty="0">
               <a:solidFill>
@@ -4176,21 +4005,7 @@
                 <a:latin typeface="Arial" panose="020B0604020202020204" pitchFamily="34" charset="0"/>
                 <a:cs typeface="Arial" panose="020B0604020202020204" pitchFamily="34" charset="0"/>
               </a:rPr>
-              <a:t>se </a:t>
-            </a:r>
-            <a:r>
-              <a:rPr lang="es-ES" sz="900" dirty="0" smtClean="0">
-                <a:latin typeface="Arial" panose="020B0604020202020204" pitchFamily="34" charset="0"/>
-                <a:cs typeface="Arial" panose="020B0604020202020204" pitchFamily="34" charset="0"/>
-              </a:rPr>
-              <a:t>define </a:t>
-            </a:r>
-            <a:r>
-              <a:rPr lang="es-ES" sz="900" dirty="0" smtClean="0">
-                <a:latin typeface="Arial" panose="020B0604020202020204" pitchFamily="34" charset="0"/>
-                <a:cs typeface="Arial" panose="020B0604020202020204" pitchFamily="34" charset="0"/>
-              </a:rPr>
-              <a:t>como</a:t>
+              <a:t>se define como</a:t>
             </a:r>
             <a:endParaRPr lang="es-ES" sz="900" dirty="0">
               <a:latin typeface="Arial" panose="020B0604020202020204" pitchFamily="34" charset="0"/>
@@ -4604,21 +4419,7 @@
                 <a:latin typeface="Arial" panose="020B0604020202020204" pitchFamily="34" charset="0"/>
                 <a:cs typeface="Arial" panose="020B0604020202020204" pitchFamily="34" charset="0"/>
               </a:rPr>
-              <a:t>se </a:t>
-            </a:r>
-            <a:r>
-              <a:rPr lang="es-ES" sz="800" dirty="0" smtClean="0">
-                <a:latin typeface="Arial" panose="020B0604020202020204" pitchFamily="34" charset="0"/>
-                <a:cs typeface="Arial" panose="020B0604020202020204" pitchFamily="34" charset="0"/>
-              </a:rPr>
-              <a:t>define </a:t>
-            </a:r>
-            <a:r>
-              <a:rPr lang="es-ES" sz="800" dirty="0" smtClean="0">
-                <a:latin typeface="Arial" panose="020B0604020202020204" pitchFamily="34" charset="0"/>
-                <a:cs typeface="Arial" panose="020B0604020202020204" pitchFamily="34" charset="0"/>
-              </a:rPr>
-              <a:t>como</a:t>
+              <a:t>se define como</a:t>
             </a:r>
             <a:endParaRPr lang="es-ES" sz="800" dirty="0">
               <a:latin typeface="Arial" panose="020B0604020202020204" pitchFamily="34" charset="0"/>
@@ -5507,13 +5308,6 @@
               </a:rPr>
               <a:t>en forma exacta</a:t>
             </a:r>
-            <a:endParaRPr lang="es-ES" sz="900" dirty="0">
-              <a:solidFill>
-                <a:schemeClr val="tx1"/>
-              </a:solidFill>
-              <a:latin typeface="Arial" panose="020B0604020202020204" pitchFamily="34" charset="0"/>
-              <a:cs typeface="Arial" panose="020B0604020202020204" pitchFamily="34" charset="0"/>
-            </a:endParaRPr>
           </a:p>
         </p:txBody>
       </p:sp>

</xml_diff>